<commit_message>
FIX #333 - moved documentation from preprocessing to calibration - updated calibration/compression to use values from 0-1 instead of 0-127
</commit_message>
<xml_diff>
--- a/doc/figures/compress.pptx
+++ b/doc/figures/compress.pptx
@@ -6,6 +6,7 @@
   </p:sldMasterIdLst>
   <p:sldIdLst>
     <p:sldId id="256" r:id="rId2"/>
+    <p:sldId id="257" r:id="rId3"/>
   </p:sldIdLst>
   <p:sldSz cx="9144000" cy="6858000" type="screen4x3"/>
   <p:notesSz cx="6858000" cy="9144000"/>
@@ -104,6 +105,22 @@
       </a:defRPr>
     </a:lvl9pPr>
   </p:defaultTextStyle>
+  <p:extLst>
+    <p:ext uri="{EFAFB233-063F-42B5-8137-9DF3F51BA10A}">
+      <p15:sldGuideLst xmlns:p15="http://schemas.microsoft.com/office/powerpoint/2012/main">
+        <p15:guide id="1" orient="horz" pos="2160">
+          <p15:clr>
+            <a:srgbClr val="A4A3A4"/>
+          </p15:clr>
+        </p15:guide>
+        <p15:guide id="2" pos="2880">
+          <p15:clr>
+            <a:srgbClr val="A4A3A4"/>
+          </p15:clr>
+        </p15:guide>
+      </p15:sldGuideLst>
+    </p:ext>
+  </p:extLst>
 </p:presentation>
 </file>
 
@@ -287,7 +304,7 @@
           <a:lstStyle/>
           <a:p>
             <a:fld id="{6C86E11D-5374-C64B-9FFD-BBE2C6D1E06E}" type="datetimeFigureOut">
-              <a:t>17/04/16</a:t>
+              <a:t>7/27/19</a:t>
             </a:fld>
             <a:endParaRPr lang="en-US"/>
           </a:p>
@@ -455,7 +472,7 @@
           <a:lstStyle/>
           <a:p>
             <a:fld id="{6C86E11D-5374-C64B-9FFD-BBE2C6D1E06E}" type="datetimeFigureOut">
-              <a:t>17/04/16</a:t>
+              <a:t>7/27/19</a:t>
             </a:fld>
             <a:endParaRPr lang="en-US"/>
           </a:p>
@@ -633,7 +650,7 @@
           <a:lstStyle/>
           <a:p>
             <a:fld id="{6C86E11D-5374-C64B-9FFD-BBE2C6D1E06E}" type="datetimeFigureOut">
-              <a:t>17/04/16</a:t>
+              <a:t>7/27/19</a:t>
             </a:fld>
             <a:endParaRPr lang="en-US"/>
           </a:p>
@@ -801,7 +818,7 @@
           <a:lstStyle/>
           <a:p>
             <a:fld id="{6C86E11D-5374-C64B-9FFD-BBE2C6D1E06E}" type="datetimeFigureOut">
-              <a:t>17/04/16</a:t>
+              <a:t>7/27/19</a:t>
             </a:fld>
             <a:endParaRPr lang="en-US"/>
           </a:p>
@@ -1045,7 +1062,7 @@
           <a:lstStyle/>
           <a:p>
             <a:fld id="{6C86E11D-5374-C64B-9FFD-BBE2C6D1E06E}" type="datetimeFigureOut">
-              <a:t>17/04/16</a:t>
+              <a:t>7/27/19</a:t>
             </a:fld>
             <a:endParaRPr lang="en-US"/>
           </a:p>
@@ -1331,7 +1348,7 @@
           <a:lstStyle/>
           <a:p>
             <a:fld id="{6C86E11D-5374-C64B-9FFD-BBE2C6D1E06E}" type="datetimeFigureOut">
-              <a:t>17/04/16</a:t>
+              <a:t>7/27/19</a:t>
             </a:fld>
             <a:endParaRPr lang="en-US"/>
           </a:p>
@@ -1751,7 +1768,7 @@
           <a:lstStyle/>
           <a:p>
             <a:fld id="{6C86E11D-5374-C64B-9FFD-BBE2C6D1E06E}" type="datetimeFigureOut">
-              <a:t>17/04/16</a:t>
+              <a:t>7/27/19</a:t>
             </a:fld>
             <a:endParaRPr lang="en-US"/>
           </a:p>
@@ -1867,7 +1884,7 @@
           <a:lstStyle/>
           <a:p>
             <a:fld id="{6C86E11D-5374-C64B-9FFD-BBE2C6D1E06E}" type="datetimeFigureOut">
-              <a:t>17/04/16</a:t>
+              <a:t>7/27/19</a:t>
             </a:fld>
             <a:endParaRPr lang="en-US"/>
           </a:p>
@@ -1960,7 +1977,7 @@
           <a:lstStyle/>
           <a:p>
             <a:fld id="{6C86E11D-5374-C64B-9FFD-BBE2C6D1E06E}" type="datetimeFigureOut">
-              <a:t>17/04/16</a:t>
+              <a:t>7/27/19</a:t>
             </a:fld>
             <a:endParaRPr lang="en-US"/>
           </a:p>
@@ -2235,7 +2252,7 @@
           <a:lstStyle/>
           <a:p>
             <a:fld id="{6C86E11D-5374-C64B-9FFD-BBE2C6D1E06E}" type="datetimeFigureOut">
-              <a:t>17/04/16</a:t>
+              <a:t>7/27/19</a:t>
             </a:fld>
             <a:endParaRPr lang="en-US"/>
           </a:p>
@@ -2486,7 +2503,7 @@
           <a:lstStyle/>
           <a:p>
             <a:fld id="{6C86E11D-5374-C64B-9FFD-BBE2C6D1E06E}" type="datetimeFigureOut">
-              <a:t>17/04/16</a:t>
+              <a:t>7/27/19</a:t>
             </a:fld>
             <a:endParaRPr lang="en-US"/>
           </a:p>
@@ -2697,7 +2714,7 @@
           </a:lstStyle>
           <a:p>
             <a:fld id="{6C86E11D-5374-C64B-9FFD-BBE2C6D1E06E}" type="datetimeFigureOut">
-              <a:t>17/04/16</a:t>
+              <a:t>7/27/19</a:t>
             </a:fld>
             <a:endParaRPr lang="en-US"/>
           </a:p>
@@ -3191,8 +3208,8 @@
         </p:nvSpPr>
         <p:spPr>
           <a:xfrm>
-            <a:off x="2348823" y="4934123"/>
-            <a:ext cx="593920" cy="369332"/>
+            <a:off x="2424116" y="4921597"/>
+            <a:ext cx="476412" cy="369332"/>
           </a:xfrm>
           <a:prstGeom prst="rect">
             <a:avLst/>
@@ -3206,8 +3223,8 @@
           <a:lstStyle/>
           <a:p>
             <a:r>
-              <a:rPr lang="en-US"/>
-              <a:t>63.5</a:t>
+              <a:rPr lang="en-US" dirty="0"/>
+              <a:t>0.5</a:t>
             </a:r>
           </a:p>
         </p:txBody>
@@ -3220,8 +3237,8 @@
         </p:nvSpPr>
         <p:spPr>
           <a:xfrm>
-            <a:off x="4415343" y="4919692"/>
-            <a:ext cx="301660" cy="369332"/>
+            <a:off x="4268857" y="4921597"/>
+            <a:ext cx="476412" cy="369332"/>
           </a:xfrm>
           <a:prstGeom prst="rect">
             <a:avLst/>
@@ -3235,8 +3252,8 @@
           <a:lstStyle/>
           <a:p>
             <a:r>
-              <a:rPr lang="en-US"/>
-              <a:t>0</a:t>
+              <a:rPr lang="en-US" dirty="0"/>
+              <a:t>0.0</a:t>
             </a:r>
           </a:p>
         </p:txBody>
@@ -3249,8 +3266,8 @@
         </p:nvSpPr>
         <p:spPr>
           <a:xfrm>
-            <a:off x="2349097" y="3210837"/>
-            <a:ext cx="535648" cy="369332"/>
+            <a:off x="2424116" y="3210837"/>
+            <a:ext cx="476412" cy="369332"/>
           </a:xfrm>
           <a:prstGeom prst="rect">
             <a:avLst/>
@@ -3264,8 +3281,8 @@
           <a:lstStyle/>
           <a:p>
             <a:r>
-              <a:rPr lang="en-US"/>
-              <a:t>127</a:t>
+              <a:rPr lang="en-US" dirty="0"/>
+              <a:t>1.0</a:t>
             </a:r>
           </a:p>
         </p:txBody>
@@ -3346,8 +3363,8 @@
         </p:nvSpPr>
         <p:spPr>
           <a:xfrm>
-            <a:off x="6252104" y="1133946"/>
-            <a:ext cx="593920" cy="369332"/>
+            <a:off x="6359932" y="1133946"/>
+            <a:ext cx="476412" cy="369332"/>
           </a:xfrm>
           <a:prstGeom prst="rect">
             <a:avLst/>
@@ -3361,8 +3378,8 @@
           <a:lstStyle/>
           <a:p>
             <a:r>
-              <a:rPr lang="en-US"/>
-              <a:t>63.5</a:t>
+              <a:rPr lang="en-US" dirty="0"/>
+              <a:t>0.5</a:t>
             </a:r>
           </a:p>
         </p:txBody>
@@ -3375,8 +3392,8 @@
         </p:nvSpPr>
         <p:spPr>
           <a:xfrm>
-            <a:off x="6367552" y="2935459"/>
-            <a:ext cx="301660" cy="369332"/>
+            <a:off x="6359932" y="2935459"/>
+            <a:ext cx="476412" cy="369332"/>
           </a:xfrm>
           <a:prstGeom prst="rect">
             <a:avLst/>
@@ -3390,8 +3407,8 @@
           <a:lstStyle/>
           <a:p>
             <a:r>
-              <a:rPr lang="en-US"/>
-              <a:t>0</a:t>
+              <a:rPr lang="en-US" dirty="0"/>
+              <a:t>0.0</a:t>
             </a:r>
           </a:p>
         </p:txBody>
@@ -3405,7 +3422,7 @@
         <p:spPr>
           <a:xfrm>
             <a:off x="4643957" y="1133946"/>
-            <a:ext cx="535648" cy="369332"/>
+            <a:ext cx="476412" cy="369332"/>
           </a:xfrm>
           <a:prstGeom prst="rect">
             <a:avLst/>
@@ -3419,8 +3436,8 @@
           <a:lstStyle/>
           <a:p>
             <a:r>
-              <a:rPr lang="en-US"/>
-              <a:t>127</a:t>
+              <a:rPr lang="en-US" dirty="0"/>
+              <a:t>1.0</a:t>
             </a:r>
           </a:p>
         </p:txBody>
@@ -3448,7 +3465,7 @@
           <a:lstStyle/>
           <a:p>
             <a:r>
-              <a:rPr lang="en-US"/>
+              <a:rPr lang="en-US" dirty="0"/>
               <a:t>LO</a:t>
             </a:r>
           </a:p>
@@ -3589,10 +3606,1532 @@
           </a:p>
         </p:txBody>
       </p:sp>
+      <p:sp>
+        <p:nvSpPr>
+          <p:cNvPr id="2" name="TextBox 1">
+            <a:extLst>
+              <a:ext uri="{FF2B5EF4-FFF2-40B4-BE49-F238E27FC236}">
+                <a16:creationId xmlns:a16="http://schemas.microsoft.com/office/drawing/2014/main" id="{08CBE8D5-058F-FB4F-BA49-909264B69BC6}"/>
+              </a:ext>
+            </a:extLst>
+          </p:cNvPr>
+          <p:cNvSpPr txBox="1"/>
+          <p:nvPr/>
+        </p:nvSpPr>
+        <p:spPr>
+          <a:xfrm>
+            <a:off x="4024332" y="5332314"/>
+            <a:ext cx="1239250" cy="369332"/>
+          </a:xfrm>
+          <a:prstGeom prst="rect">
+            <a:avLst/>
+          </a:prstGeom>
+          <a:noFill/>
+        </p:spPr>
+        <p:txBody>
+          <a:bodyPr wrap="none" rtlCol="0">
+            <a:spAutoFit/>
+          </a:bodyPr>
+          <a:lstStyle/>
+          <a:p>
+            <a:r>
+              <a:rPr lang="en-US" dirty="0"/>
+              <a:t>Input value</a:t>
+            </a:r>
+          </a:p>
+        </p:txBody>
+      </p:sp>
+      <p:sp>
+        <p:nvSpPr>
+          <p:cNvPr id="21" name="TextBox 20">
+            <a:extLst>
+              <a:ext uri="{FF2B5EF4-FFF2-40B4-BE49-F238E27FC236}">
+                <a16:creationId xmlns:a16="http://schemas.microsoft.com/office/drawing/2014/main" id="{2F98238C-25D1-E94A-A444-FAEA7E017A33}"/>
+              </a:ext>
+            </a:extLst>
+          </p:cNvPr>
+          <p:cNvSpPr txBox="1"/>
+          <p:nvPr/>
+        </p:nvSpPr>
+        <p:spPr>
+          <a:xfrm rot="16200000">
+            <a:off x="1548870" y="2935459"/>
+            <a:ext cx="1410771" cy="369332"/>
+          </a:xfrm>
+          <a:prstGeom prst="rect">
+            <a:avLst/>
+          </a:prstGeom>
+          <a:noFill/>
+        </p:spPr>
+        <p:txBody>
+          <a:bodyPr wrap="none" rtlCol="0">
+            <a:spAutoFit/>
+          </a:bodyPr>
+          <a:lstStyle/>
+          <a:p>
+            <a:r>
+              <a:rPr lang="en-US" dirty="0"/>
+              <a:t>Output value</a:t>
+            </a:r>
+          </a:p>
+        </p:txBody>
+      </p:sp>
     </p:spTree>
     <p:extLst>
       <p:ext uri="{BB962C8B-B14F-4D97-AF65-F5344CB8AC3E}">
         <p14:creationId xmlns:p14="http://schemas.microsoft.com/office/powerpoint/2010/main" val="135742931"/>
+      </p:ext>
+    </p:extLst>
+  </p:cSld>
+  <p:clrMapOvr>
+    <a:masterClrMapping/>
+  </p:clrMapOvr>
+</p:sld>
+</file>
+
+<file path=ppt/slides/slide2.xml><?xml version="1.0" encoding="utf-8"?>
+<p:sld xmlns:a="http://schemas.openxmlformats.org/drawingml/2006/main" xmlns:r="http://schemas.openxmlformats.org/officeDocument/2006/relationships" xmlns:p="http://schemas.openxmlformats.org/presentationml/2006/main">
+  <p:cSld>
+    <p:spTree>
+      <p:nvGrpSpPr>
+        <p:cNvPr id="1" name=""/>
+        <p:cNvGrpSpPr/>
+        <p:nvPr/>
+      </p:nvGrpSpPr>
+      <p:grpSpPr>
+        <a:xfrm>
+          <a:off x="0" y="0"/>
+          <a:ext cx="0" cy="0"/>
+          <a:chOff x="0" y="0"/>
+          <a:chExt cx="0" cy="0"/>
+        </a:xfrm>
+      </p:grpSpPr>
+      <p:sp>
+        <p:nvSpPr>
+          <p:cNvPr id="2" name="Rectangle 1">
+            <a:extLst>
+              <a:ext uri="{FF2B5EF4-FFF2-40B4-BE49-F238E27FC236}">
+                <a16:creationId xmlns:a16="http://schemas.microsoft.com/office/drawing/2014/main" id="{7609F0D2-0F3B-0247-81A6-BCA701EBD4C8}"/>
+              </a:ext>
+            </a:extLst>
+          </p:cNvPr>
+          <p:cNvSpPr/>
+          <p:nvPr/>
+        </p:nvSpPr>
+        <p:spPr>
+          <a:xfrm>
+            <a:off x="2355444" y="1267012"/>
+            <a:ext cx="1100407" cy="1100407"/>
+          </a:xfrm>
+          <a:prstGeom prst="rect">
+            <a:avLst/>
+          </a:prstGeom>
+          <a:noFill/>
+          <a:ln>
+            <a:solidFill>
+              <a:schemeClr val="tx1"/>
+            </a:solidFill>
+          </a:ln>
+        </p:spPr>
+        <p:style>
+          <a:lnRef idx="1">
+            <a:schemeClr val="accent1"/>
+          </a:lnRef>
+          <a:fillRef idx="3">
+            <a:schemeClr val="accent1"/>
+          </a:fillRef>
+          <a:effectRef idx="2">
+            <a:schemeClr val="accent1"/>
+          </a:effectRef>
+          <a:fontRef idx="minor">
+            <a:schemeClr val="lt1"/>
+          </a:fontRef>
+        </p:style>
+        <p:txBody>
+          <a:bodyPr rtlCol="0" anchor="ctr"/>
+          <a:lstStyle/>
+          <a:p>
+            <a:pPr algn="ctr"/>
+            <a:endParaRPr lang="en-US"/>
+          </a:p>
+        </p:txBody>
+      </p:sp>
+      <p:sp>
+        <p:nvSpPr>
+          <p:cNvPr id="3" name="Rectangle 2">
+            <a:extLst>
+              <a:ext uri="{FF2B5EF4-FFF2-40B4-BE49-F238E27FC236}">
+                <a16:creationId xmlns:a16="http://schemas.microsoft.com/office/drawing/2014/main" id="{B5C190F9-F8DD-EB46-AC86-3C3A67910D4E}"/>
+              </a:ext>
+            </a:extLst>
+          </p:cNvPr>
+          <p:cNvSpPr/>
+          <p:nvPr/>
+        </p:nvSpPr>
+        <p:spPr>
+          <a:xfrm>
+            <a:off x="4061072" y="1279537"/>
+            <a:ext cx="1100407" cy="1100407"/>
+          </a:xfrm>
+          <a:prstGeom prst="rect">
+            <a:avLst/>
+          </a:prstGeom>
+          <a:noFill/>
+          <a:ln>
+            <a:solidFill>
+              <a:schemeClr val="tx1"/>
+            </a:solidFill>
+          </a:ln>
+        </p:spPr>
+        <p:style>
+          <a:lnRef idx="1">
+            <a:schemeClr val="accent1"/>
+          </a:lnRef>
+          <a:fillRef idx="3">
+            <a:schemeClr val="accent1"/>
+          </a:fillRef>
+          <a:effectRef idx="2">
+            <a:schemeClr val="accent1"/>
+          </a:effectRef>
+          <a:fontRef idx="minor">
+            <a:schemeClr val="lt1"/>
+          </a:fontRef>
+        </p:style>
+        <p:txBody>
+          <a:bodyPr rtlCol="0" anchor="ctr"/>
+          <a:lstStyle/>
+          <a:p>
+            <a:pPr algn="ctr"/>
+            <a:endParaRPr lang="en-US"/>
+          </a:p>
+        </p:txBody>
+      </p:sp>
+      <p:sp>
+        <p:nvSpPr>
+          <p:cNvPr id="4" name="Rectangle 3">
+            <a:extLst>
+              <a:ext uri="{FF2B5EF4-FFF2-40B4-BE49-F238E27FC236}">
+                <a16:creationId xmlns:a16="http://schemas.microsoft.com/office/drawing/2014/main" id="{80C59577-5049-7D4F-9BBC-E3CD4ECA592C}"/>
+              </a:ext>
+            </a:extLst>
+          </p:cNvPr>
+          <p:cNvSpPr/>
+          <p:nvPr/>
+        </p:nvSpPr>
+        <p:spPr>
+          <a:xfrm>
+            <a:off x="5766700" y="1254484"/>
+            <a:ext cx="1100407" cy="1100407"/>
+          </a:xfrm>
+          <a:prstGeom prst="rect">
+            <a:avLst/>
+          </a:prstGeom>
+          <a:noFill/>
+          <a:ln>
+            <a:solidFill>
+              <a:schemeClr val="tx1"/>
+            </a:solidFill>
+          </a:ln>
+        </p:spPr>
+        <p:style>
+          <a:lnRef idx="1">
+            <a:schemeClr val="accent1"/>
+          </a:lnRef>
+          <a:fillRef idx="3">
+            <a:schemeClr val="accent1"/>
+          </a:fillRef>
+          <a:effectRef idx="2">
+            <a:schemeClr val="accent1"/>
+          </a:effectRef>
+          <a:fontRef idx="minor">
+            <a:schemeClr val="lt1"/>
+          </a:fontRef>
+        </p:style>
+        <p:txBody>
+          <a:bodyPr rtlCol="0" anchor="ctr"/>
+          <a:lstStyle/>
+          <a:p>
+            <a:pPr algn="ctr"/>
+            <a:endParaRPr lang="en-US"/>
+          </a:p>
+        </p:txBody>
+      </p:sp>
+      <p:sp>
+        <p:nvSpPr>
+          <p:cNvPr id="8" name="Rectangle 7">
+            <a:extLst>
+              <a:ext uri="{FF2B5EF4-FFF2-40B4-BE49-F238E27FC236}">
+                <a16:creationId xmlns:a16="http://schemas.microsoft.com/office/drawing/2014/main" id="{2DF7FF76-AF6E-E84A-B940-4C22543A6A14}"/>
+              </a:ext>
+            </a:extLst>
+          </p:cNvPr>
+          <p:cNvSpPr/>
+          <p:nvPr/>
+        </p:nvSpPr>
+        <p:spPr>
+          <a:xfrm>
+            <a:off x="2355444" y="2772222"/>
+            <a:ext cx="1100407" cy="1100407"/>
+          </a:xfrm>
+          <a:prstGeom prst="rect">
+            <a:avLst/>
+          </a:prstGeom>
+          <a:noFill/>
+          <a:ln>
+            <a:solidFill>
+              <a:schemeClr val="tx1"/>
+            </a:solidFill>
+          </a:ln>
+        </p:spPr>
+        <p:style>
+          <a:lnRef idx="1">
+            <a:schemeClr val="accent1"/>
+          </a:lnRef>
+          <a:fillRef idx="3">
+            <a:schemeClr val="accent1"/>
+          </a:fillRef>
+          <a:effectRef idx="2">
+            <a:schemeClr val="accent1"/>
+          </a:effectRef>
+          <a:fontRef idx="minor">
+            <a:schemeClr val="lt1"/>
+          </a:fontRef>
+        </p:style>
+        <p:txBody>
+          <a:bodyPr rtlCol="0" anchor="ctr"/>
+          <a:lstStyle/>
+          <a:p>
+            <a:pPr algn="ctr"/>
+            <a:endParaRPr lang="en-US"/>
+          </a:p>
+        </p:txBody>
+      </p:sp>
+      <p:sp>
+        <p:nvSpPr>
+          <p:cNvPr id="9" name="Rectangle 8">
+            <a:extLst>
+              <a:ext uri="{FF2B5EF4-FFF2-40B4-BE49-F238E27FC236}">
+                <a16:creationId xmlns:a16="http://schemas.microsoft.com/office/drawing/2014/main" id="{3F9A8E0F-2FCA-A14F-94D2-67DFBBBBF0BD}"/>
+              </a:ext>
+            </a:extLst>
+          </p:cNvPr>
+          <p:cNvSpPr/>
+          <p:nvPr/>
+        </p:nvSpPr>
+        <p:spPr>
+          <a:xfrm>
+            <a:off x="4061072" y="2784747"/>
+            <a:ext cx="1100407" cy="1100407"/>
+          </a:xfrm>
+          <a:prstGeom prst="rect">
+            <a:avLst/>
+          </a:prstGeom>
+          <a:noFill/>
+          <a:ln>
+            <a:solidFill>
+              <a:schemeClr val="tx1"/>
+            </a:solidFill>
+          </a:ln>
+        </p:spPr>
+        <p:style>
+          <a:lnRef idx="1">
+            <a:schemeClr val="accent1"/>
+          </a:lnRef>
+          <a:fillRef idx="3">
+            <a:schemeClr val="accent1"/>
+          </a:fillRef>
+          <a:effectRef idx="2">
+            <a:schemeClr val="accent1"/>
+          </a:effectRef>
+          <a:fontRef idx="minor">
+            <a:schemeClr val="lt1"/>
+          </a:fontRef>
+        </p:style>
+        <p:txBody>
+          <a:bodyPr rtlCol="0" anchor="ctr"/>
+          <a:lstStyle/>
+          <a:p>
+            <a:pPr algn="ctr"/>
+            <a:endParaRPr lang="en-US"/>
+          </a:p>
+        </p:txBody>
+      </p:sp>
+      <p:sp>
+        <p:nvSpPr>
+          <p:cNvPr id="10" name="Rectangle 9">
+            <a:extLst>
+              <a:ext uri="{FF2B5EF4-FFF2-40B4-BE49-F238E27FC236}">
+                <a16:creationId xmlns:a16="http://schemas.microsoft.com/office/drawing/2014/main" id="{6A69E589-B965-984C-BA15-14CFABFEB3DB}"/>
+              </a:ext>
+            </a:extLst>
+          </p:cNvPr>
+          <p:cNvSpPr/>
+          <p:nvPr/>
+        </p:nvSpPr>
+        <p:spPr>
+          <a:xfrm>
+            <a:off x="5766700" y="2759694"/>
+            <a:ext cx="1100407" cy="1100407"/>
+          </a:xfrm>
+          <a:prstGeom prst="rect">
+            <a:avLst/>
+          </a:prstGeom>
+          <a:noFill/>
+          <a:ln>
+            <a:solidFill>
+              <a:schemeClr val="tx1"/>
+            </a:solidFill>
+          </a:ln>
+        </p:spPr>
+        <p:style>
+          <a:lnRef idx="1">
+            <a:schemeClr val="accent1"/>
+          </a:lnRef>
+          <a:fillRef idx="3">
+            <a:schemeClr val="accent1"/>
+          </a:fillRef>
+          <a:effectRef idx="2">
+            <a:schemeClr val="accent1"/>
+          </a:effectRef>
+          <a:fontRef idx="minor">
+            <a:schemeClr val="lt1"/>
+          </a:fontRef>
+        </p:style>
+        <p:txBody>
+          <a:bodyPr rtlCol="0" anchor="ctr"/>
+          <a:lstStyle/>
+          <a:p>
+            <a:pPr algn="ctr"/>
+            <a:endParaRPr lang="en-US"/>
+          </a:p>
+        </p:txBody>
+      </p:sp>
+      <p:sp>
+        <p:nvSpPr>
+          <p:cNvPr id="11" name="Rectangle 10">
+            <a:extLst>
+              <a:ext uri="{FF2B5EF4-FFF2-40B4-BE49-F238E27FC236}">
+                <a16:creationId xmlns:a16="http://schemas.microsoft.com/office/drawing/2014/main" id="{B419C0B4-6E9C-5848-A3CA-5046CC8CCD87}"/>
+              </a:ext>
+            </a:extLst>
+          </p:cNvPr>
+          <p:cNvSpPr/>
+          <p:nvPr/>
+        </p:nvSpPr>
+        <p:spPr>
+          <a:xfrm>
+            <a:off x="2355444" y="4277432"/>
+            <a:ext cx="1100407" cy="1100407"/>
+          </a:xfrm>
+          <a:prstGeom prst="rect">
+            <a:avLst/>
+          </a:prstGeom>
+          <a:noFill/>
+          <a:ln>
+            <a:solidFill>
+              <a:schemeClr val="tx1"/>
+            </a:solidFill>
+          </a:ln>
+        </p:spPr>
+        <p:style>
+          <a:lnRef idx="1">
+            <a:schemeClr val="accent1"/>
+          </a:lnRef>
+          <a:fillRef idx="3">
+            <a:schemeClr val="accent1"/>
+          </a:fillRef>
+          <a:effectRef idx="2">
+            <a:schemeClr val="accent1"/>
+          </a:effectRef>
+          <a:fontRef idx="minor">
+            <a:schemeClr val="lt1"/>
+          </a:fontRef>
+        </p:style>
+        <p:txBody>
+          <a:bodyPr rtlCol="0" anchor="ctr"/>
+          <a:lstStyle/>
+          <a:p>
+            <a:pPr algn="ctr"/>
+            <a:endParaRPr lang="en-US"/>
+          </a:p>
+        </p:txBody>
+      </p:sp>
+      <p:sp>
+        <p:nvSpPr>
+          <p:cNvPr id="12" name="Rectangle 11">
+            <a:extLst>
+              <a:ext uri="{FF2B5EF4-FFF2-40B4-BE49-F238E27FC236}">
+                <a16:creationId xmlns:a16="http://schemas.microsoft.com/office/drawing/2014/main" id="{41693AE2-6BA9-E647-AB81-48F6A8C75E5A}"/>
+              </a:ext>
+            </a:extLst>
+          </p:cNvPr>
+          <p:cNvSpPr/>
+          <p:nvPr/>
+        </p:nvSpPr>
+        <p:spPr>
+          <a:xfrm>
+            <a:off x="4061072" y="4289957"/>
+            <a:ext cx="1100407" cy="1100407"/>
+          </a:xfrm>
+          <a:prstGeom prst="rect">
+            <a:avLst/>
+          </a:prstGeom>
+          <a:noFill/>
+          <a:ln>
+            <a:solidFill>
+              <a:schemeClr val="tx1"/>
+            </a:solidFill>
+          </a:ln>
+        </p:spPr>
+        <p:style>
+          <a:lnRef idx="1">
+            <a:schemeClr val="accent1"/>
+          </a:lnRef>
+          <a:fillRef idx="3">
+            <a:schemeClr val="accent1"/>
+          </a:fillRef>
+          <a:effectRef idx="2">
+            <a:schemeClr val="accent1"/>
+          </a:effectRef>
+          <a:fontRef idx="minor">
+            <a:schemeClr val="lt1"/>
+          </a:fontRef>
+        </p:style>
+        <p:txBody>
+          <a:bodyPr rtlCol="0" anchor="ctr"/>
+          <a:lstStyle/>
+          <a:p>
+            <a:pPr algn="ctr"/>
+            <a:endParaRPr lang="en-US"/>
+          </a:p>
+        </p:txBody>
+      </p:sp>
+      <p:sp>
+        <p:nvSpPr>
+          <p:cNvPr id="13" name="Rectangle 12">
+            <a:extLst>
+              <a:ext uri="{FF2B5EF4-FFF2-40B4-BE49-F238E27FC236}">
+                <a16:creationId xmlns:a16="http://schemas.microsoft.com/office/drawing/2014/main" id="{F8FCDD35-57E4-B84C-B11F-2B0613D52A13}"/>
+              </a:ext>
+            </a:extLst>
+          </p:cNvPr>
+          <p:cNvSpPr/>
+          <p:nvPr/>
+        </p:nvSpPr>
+        <p:spPr>
+          <a:xfrm>
+            <a:off x="5766700" y="4264904"/>
+            <a:ext cx="1100407" cy="1100407"/>
+          </a:xfrm>
+          <a:prstGeom prst="rect">
+            <a:avLst/>
+          </a:prstGeom>
+          <a:noFill/>
+          <a:ln>
+            <a:solidFill>
+              <a:schemeClr val="tx1"/>
+            </a:solidFill>
+          </a:ln>
+        </p:spPr>
+        <p:style>
+          <a:lnRef idx="1">
+            <a:schemeClr val="accent1"/>
+          </a:lnRef>
+          <a:fillRef idx="3">
+            <a:schemeClr val="accent1"/>
+          </a:fillRef>
+          <a:effectRef idx="2">
+            <a:schemeClr val="accent1"/>
+          </a:effectRef>
+          <a:fontRef idx="minor">
+            <a:schemeClr val="lt1"/>
+          </a:fontRef>
+        </p:style>
+        <p:txBody>
+          <a:bodyPr rtlCol="0" anchor="ctr"/>
+          <a:lstStyle/>
+          <a:p>
+            <a:pPr algn="ctr"/>
+            <a:endParaRPr lang="en-US"/>
+          </a:p>
+        </p:txBody>
+      </p:sp>
+      <p:cxnSp>
+        <p:nvCxnSpPr>
+          <p:cNvPr id="25" name="Straight Connector 24">
+            <a:extLst>
+              <a:ext uri="{FF2B5EF4-FFF2-40B4-BE49-F238E27FC236}">
+                <a16:creationId xmlns:a16="http://schemas.microsoft.com/office/drawing/2014/main" id="{01701957-BDCE-3142-BBA2-A1C3875258B5}"/>
+              </a:ext>
+            </a:extLst>
+          </p:cNvPr>
+          <p:cNvCxnSpPr>
+            <a:cxnSpLocks/>
+          </p:cNvCxnSpPr>
+          <p:nvPr/>
+        </p:nvCxnSpPr>
+        <p:spPr>
+          <a:xfrm flipV="1">
+            <a:off x="2355438" y="1543051"/>
+            <a:ext cx="1100413" cy="548145"/>
+          </a:xfrm>
+          <a:prstGeom prst="line">
+            <a:avLst/>
+          </a:prstGeom>
+        </p:spPr>
+        <p:style>
+          <a:lnRef idx="3">
+            <a:schemeClr val="accent2"/>
+          </a:lnRef>
+          <a:fillRef idx="0">
+            <a:schemeClr val="accent2"/>
+          </a:fillRef>
+          <a:effectRef idx="2">
+            <a:schemeClr val="accent2"/>
+          </a:effectRef>
+          <a:fontRef idx="minor">
+            <a:schemeClr val="tx1"/>
+          </a:fontRef>
+        </p:style>
+      </p:cxnSp>
+      <p:cxnSp>
+        <p:nvCxnSpPr>
+          <p:cNvPr id="29" name="Straight Connector 28">
+            <a:extLst>
+              <a:ext uri="{FF2B5EF4-FFF2-40B4-BE49-F238E27FC236}">
+                <a16:creationId xmlns:a16="http://schemas.microsoft.com/office/drawing/2014/main" id="{3E0D0802-D110-F34B-9B8B-A539E812BEF3}"/>
+              </a:ext>
+            </a:extLst>
+          </p:cNvPr>
+          <p:cNvCxnSpPr>
+            <a:cxnSpLocks/>
+          </p:cNvCxnSpPr>
+          <p:nvPr/>
+        </p:nvCxnSpPr>
+        <p:spPr>
+          <a:xfrm flipV="1">
+            <a:off x="4061069" y="1279536"/>
+            <a:ext cx="1100410" cy="811661"/>
+          </a:xfrm>
+          <a:prstGeom prst="line">
+            <a:avLst/>
+          </a:prstGeom>
+        </p:spPr>
+        <p:style>
+          <a:lnRef idx="3">
+            <a:schemeClr val="accent2"/>
+          </a:lnRef>
+          <a:fillRef idx="0">
+            <a:schemeClr val="accent2"/>
+          </a:fillRef>
+          <a:effectRef idx="2">
+            <a:schemeClr val="accent2"/>
+          </a:effectRef>
+          <a:fontRef idx="minor">
+            <a:schemeClr val="tx1"/>
+          </a:fontRef>
+        </p:style>
+      </p:cxnSp>
+      <p:cxnSp>
+        <p:nvCxnSpPr>
+          <p:cNvPr id="31" name="Straight Connector 30">
+            <a:extLst>
+              <a:ext uri="{FF2B5EF4-FFF2-40B4-BE49-F238E27FC236}">
+                <a16:creationId xmlns:a16="http://schemas.microsoft.com/office/drawing/2014/main" id="{ECAC69B7-488B-C347-893E-F57B5E56BF52}"/>
+              </a:ext>
+            </a:extLst>
+          </p:cNvPr>
+          <p:cNvCxnSpPr>
+            <a:cxnSpLocks/>
+          </p:cNvCxnSpPr>
+          <p:nvPr/>
+        </p:nvCxnSpPr>
+        <p:spPr>
+          <a:xfrm flipV="1">
+            <a:off x="5766694" y="1254480"/>
+            <a:ext cx="824370" cy="848308"/>
+          </a:xfrm>
+          <a:prstGeom prst="line">
+            <a:avLst/>
+          </a:prstGeom>
+        </p:spPr>
+        <p:style>
+          <a:lnRef idx="3">
+            <a:schemeClr val="accent2"/>
+          </a:lnRef>
+          <a:fillRef idx="0">
+            <a:schemeClr val="accent2"/>
+          </a:fillRef>
+          <a:effectRef idx="2">
+            <a:schemeClr val="accent2"/>
+          </a:effectRef>
+          <a:fontRef idx="minor">
+            <a:schemeClr val="tx1"/>
+          </a:fontRef>
+        </p:style>
+      </p:cxnSp>
+      <p:cxnSp>
+        <p:nvCxnSpPr>
+          <p:cNvPr id="37" name="Straight Connector 36">
+            <a:extLst>
+              <a:ext uri="{FF2B5EF4-FFF2-40B4-BE49-F238E27FC236}">
+                <a16:creationId xmlns:a16="http://schemas.microsoft.com/office/drawing/2014/main" id="{C0289445-84EF-124B-85B9-DC6668A17A15}"/>
+              </a:ext>
+            </a:extLst>
+          </p:cNvPr>
+          <p:cNvCxnSpPr>
+            <a:cxnSpLocks/>
+          </p:cNvCxnSpPr>
+          <p:nvPr/>
+        </p:nvCxnSpPr>
+        <p:spPr>
+          <a:xfrm flipV="1">
+            <a:off x="2355438" y="3035826"/>
+            <a:ext cx="1100413" cy="836803"/>
+          </a:xfrm>
+          <a:prstGeom prst="line">
+            <a:avLst/>
+          </a:prstGeom>
+        </p:spPr>
+        <p:style>
+          <a:lnRef idx="3">
+            <a:schemeClr val="accent2"/>
+          </a:lnRef>
+          <a:fillRef idx="0">
+            <a:schemeClr val="accent2"/>
+          </a:fillRef>
+          <a:effectRef idx="2">
+            <a:schemeClr val="accent2"/>
+          </a:effectRef>
+          <a:fontRef idx="minor">
+            <a:schemeClr val="tx1"/>
+          </a:fontRef>
+        </p:style>
+      </p:cxnSp>
+      <p:cxnSp>
+        <p:nvCxnSpPr>
+          <p:cNvPr id="38" name="Straight Connector 37">
+            <a:extLst>
+              <a:ext uri="{FF2B5EF4-FFF2-40B4-BE49-F238E27FC236}">
+                <a16:creationId xmlns:a16="http://schemas.microsoft.com/office/drawing/2014/main" id="{ACED5D0C-C639-C64C-8973-33AF9C8B0393}"/>
+              </a:ext>
+            </a:extLst>
+          </p:cNvPr>
+          <p:cNvCxnSpPr>
+            <a:cxnSpLocks/>
+          </p:cNvCxnSpPr>
+          <p:nvPr/>
+        </p:nvCxnSpPr>
+        <p:spPr>
+          <a:xfrm flipV="1">
+            <a:off x="2647483" y="4553564"/>
+            <a:ext cx="819137" cy="836800"/>
+          </a:xfrm>
+          <a:prstGeom prst="line">
+            <a:avLst/>
+          </a:prstGeom>
+        </p:spPr>
+        <p:style>
+          <a:lnRef idx="3">
+            <a:schemeClr val="accent2"/>
+          </a:lnRef>
+          <a:fillRef idx="0">
+            <a:schemeClr val="accent2"/>
+          </a:fillRef>
+          <a:effectRef idx="2">
+            <a:schemeClr val="accent2"/>
+          </a:effectRef>
+          <a:fontRef idx="minor">
+            <a:schemeClr val="tx1"/>
+          </a:fontRef>
+        </p:style>
+      </p:cxnSp>
+      <p:cxnSp>
+        <p:nvCxnSpPr>
+          <p:cNvPr id="42" name="Straight Connector 41">
+            <a:extLst>
+              <a:ext uri="{FF2B5EF4-FFF2-40B4-BE49-F238E27FC236}">
+                <a16:creationId xmlns:a16="http://schemas.microsoft.com/office/drawing/2014/main" id="{03DACF0A-1BAB-1B41-9410-0F7923A67917}"/>
+              </a:ext>
+            </a:extLst>
+          </p:cNvPr>
+          <p:cNvCxnSpPr>
+            <a:cxnSpLocks/>
+          </p:cNvCxnSpPr>
+          <p:nvPr/>
+        </p:nvCxnSpPr>
+        <p:spPr>
+          <a:xfrm flipV="1">
+            <a:off x="4061066" y="2784747"/>
+            <a:ext cx="1100413" cy="1100407"/>
+          </a:xfrm>
+          <a:prstGeom prst="line">
+            <a:avLst/>
+          </a:prstGeom>
+        </p:spPr>
+        <p:style>
+          <a:lnRef idx="3">
+            <a:schemeClr val="accent2"/>
+          </a:lnRef>
+          <a:fillRef idx="0">
+            <a:schemeClr val="accent2"/>
+          </a:fillRef>
+          <a:effectRef idx="2">
+            <a:schemeClr val="accent2"/>
+          </a:effectRef>
+          <a:fontRef idx="minor">
+            <a:schemeClr val="tx1"/>
+          </a:fontRef>
+        </p:style>
+      </p:cxnSp>
+      <p:cxnSp>
+        <p:nvCxnSpPr>
+          <p:cNvPr id="45" name="Straight Connector 44">
+            <a:extLst>
+              <a:ext uri="{FF2B5EF4-FFF2-40B4-BE49-F238E27FC236}">
+                <a16:creationId xmlns:a16="http://schemas.microsoft.com/office/drawing/2014/main" id="{C3EC9ED2-1818-2A40-99A7-1854A54EB275}"/>
+              </a:ext>
+            </a:extLst>
+          </p:cNvPr>
+          <p:cNvCxnSpPr>
+            <a:cxnSpLocks/>
+          </p:cNvCxnSpPr>
+          <p:nvPr/>
+        </p:nvCxnSpPr>
+        <p:spPr>
+          <a:xfrm flipV="1">
+            <a:off x="4335052" y="4289957"/>
+            <a:ext cx="826427" cy="1100408"/>
+          </a:xfrm>
+          <a:prstGeom prst="line">
+            <a:avLst/>
+          </a:prstGeom>
+        </p:spPr>
+        <p:style>
+          <a:lnRef idx="3">
+            <a:schemeClr val="accent2"/>
+          </a:lnRef>
+          <a:fillRef idx="0">
+            <a:schemeClr val="accent2"/>
+          </a:fillRef>
+          <a:effectRef idx="2">
+            <a:schemeClr val="accent2"/>
+          </a:effectRef>
+          <a:fontRef idx="minor">
+            <a:schemeClr val="tx1"/>
+          </a:fontRef>
+        </p:style>
+      </p:cxnSp>
+      <p:cxnSp>
+        <p:nvCxnSpPr>
+          <p:cNvPr id="49" name="Straight Connector 48">
+            <a:extLst>
+              <a:ext uri="{FF2B5EF4-FFF2-40B4-BE49-F238E27FC236}">
+                <a16:creationId xmlns:a16="http://schemas.microsoft.com/office/drawing/2014/main" id="{48275AB2-1D5F-D945-9FBD-18DF8E88FB7C}"/>
+              </a:ext>
+            </a:extLst>
+          </p:cNvPr>
+          <p:cNvCxnSpPr>
+            <a:cxnSpLocks/>
+          </p:cNvCxnSpPr>
+          <p:nvPr/>
+        </p:nvCxnSpPr>
+        <p:spPr>
+          <a:xfrm flipV="1">
+            <a:off x="5766694" y="2750305"/>
+            <a:ext cx="812778" cy="1109796"/>
+          </a:xfrm>
+          <a:prstGeom prst="line">
+            <a:avLst/>
+          </a:prstGeom>
+        </p:spPr>
+        <p:style>
+          <a:lnRef idx="3">
+            <a:schemeClr val="accent2"/>
+          </a:lnRef>
+          <a:fillRef idx="0">
+            <a:schemeClr val="accent2"/>
+          </a:fillRef>
+          <a:effectRef idx="2">
+            <a:schemeClr val="accent2"/>
+          </a:effectRef>
+          <a:fontRef idx="minor">
+            <a:schemeClr val="tx1"/>
+          </a:fontRef>
+        </p:style>
+      </p:cxnSp>
+      <p:cxnSp>
+        <p:nvCxnSpPr>
+          <p:cNvPr id="50" name="Straight Connector 49">
+            <a:extLst>
+              <a:ext uri="{FF2B5EF4-FFF2-40B4-BE49-F238E27FC236}">
+                <a16:creationId xmlns:a16="http://schemas.microsoft.com/office/drawing/2014/main" id="{B255E671-56FA-8549-BE90-BEE3D24CF81A}"/>
+              </a:ext>
+            </a:extLst>
+          </p:cNvPr>
+          <p:cNvCxnSpPr>
+            <a:cxnSpLocks/>
+          </p:cNvCxnSpPr>
+          <p:nvPr/>
+        </p:nvCxnSpPr>
+        <p:spPr>
+          <a:xfrm flipV="1">
+            <a:off x="6038618" y="4255515"/>
+            <a:ext cx="552446" cy="1122325"/>
+          </a:xfrm>
+          <a:prstGeom prst="line">
+            <a:avLst/>
+          </a:prstGeom>
+        </p:spPr>
+        <p:style>
+          <a:lnRef idx="3">
+            <a:schemeClr val="accent2"/>
+          </a:lnRef>
+          <a:fillRef idx="0">
+            <a:schemeClr val="accent2"/>
+          </a:fillRef>
+          <a:effectRef idx="2">
+            <a:schemeClr val="accent2"/>
+          </a:effectRef>
+          <a:fontRef idx="minor">
+            <a:schemeClr val="tx1"/>
+          </a:fontRef>
+        </p:style>
+      </p:cxnSp>
+      <p:sp>
+        <p:nvSpPr>
+          <p:cNvPr id="62" name="TextBox 61">
+            <a:extLst>
+              <a:ext uri="{FF2B5EF4-FFF2-40B4-BE49-F238E27FC236}">
+                <a16:creationId xmlns:a16="http://schemas.microsoft.com/office/drawing/2014/main" id="{FFA73938-D5EB-5249-8D96-F7B55FF5C692}"/>
+              </a:ext>
+            </a:extLst>
+          </p:cNvPr>
+          <p:cNvSpPr txBox="1"/>
+          <p:nvPr/>
+        </p:nvSpPr>
+        <p:spPr>
+          <a:xfrm>
+            <a:off x="3975505" y="3715687"/>
+            <a:ext cx="593432" cy="369332"/>
+          </a:xfrm>
+          <a:prstGeom prst="rect">
+            <a:avLst/>
+          </a:prstGeom>
+          <a:noFill/>
+        </p:spPr>
+        <p:txBody>
+          <a:bodyPr wrap="none" rtlCol="0">
+            <a:spAutoFit/>
+          </a:bodyPr>
+          <a:lstStyle/>
+          <a:p>
+            <a:r>
+              <a:rPr lang="en-US" dirty="0"/>
+              <a:t>0.50</a:t>
+            </a:r>
+          </a:p>
+        </p:txBody>
+      </p:sp>
+      <p:sp>
+        <p:nvSpPr>
+          <p:cNvPr id="64" name="TextBox 63">
+            <a:extLst>
+              <a:ext uri="{FF2B5EF4-FFF2-40B4-BE49-F238E27FC236}">
+                <a16:creationId xmlns:a16="http://schemas.microsoft.com/office/drawing/2014/main" id="{5315118F-3B4C-2549-8D72-7FEAD89CA626}"/>
+              </a:ext>
+            </a:extLst>
+          </p:cNvPr>
+          <p:cNvSpPr txBox="1"/>
+          <p:nvPr/>
+        </p:nvSpPr>
+        <p:spPr>
+          <a:xfrm>
+            <a:off x="4742844" y="2586677"/>
+            <a:ext cx="593432" cy="369332"/>
+          </a:xfrm>
+          <a:prstGeom prst="rect">
+            <a:avLst/>
+          </a:prstGeom>
+          <a:noFill/>
+        </p:spPr>
+        <p:txBody>
+          <a:bodyPr wrap="none" rtlCol="0">
+            <a:spAutoFit/>
+          </a:bodyPr>
+          <a:lstStyle/>
+          <a:p>
+            <a:r>
+              <a:rPr lang="en-US" dirty="0"/>
+              <a:t>0.50</a:t>
+            </a:r>
+          </a:p>
+        </p:txBody>
+      </p:sp>
+      <p:sp>
+        <p:nvSpPr>
+          <p:cNvPr id="65" name="TextBox 64">
+            <a:extLst>
+              <a:ext uri="{FF2B5EF4-FFF2-40B4-BE49-F238E27FC236}">
+                <a16:creationId xmlns:a16="http://schemas.microsoft.com/office/drawing/2014/main" id="{E6AB66D3-AF84-FF4A-9174-8F8853BE0B07}"/>
+              </a:ext>
+            </a:extLst>
+          </p:cNvPr>
+          <p:cNvSpPr txBox="1"/>
+          <p:nvPr/>
+        </p:nvSpPr>
+        <p:spPr>
+          <a:xfrm>
+            <a:off x="3975505" y="5195845"/>
+            <a:ext cx="593432" cy="369332"/>
+          </a:xfrm>
+          <a:prstGeom prst="rect">
+            <a:avLst/>
+          </a:prstGeom>
+          <a:noFill/>
+        </p:spPr>
+        <p:txBody>
+          <a:bodyPr wrap="none" rtlCol="0">
+            <a:spAutoFit/>
+          </a:bodyPr>
+          <a:lstStyle/>
+          <a:p>
+            <a:r>
+              <a:rPr lang="en-US" dirty="0"/>
+              <a:t>0.25</a:t>
+            </a:r>
+          </a:p>
+        </p:txBody>
+      </p:sp>
+      <p:sp>
+        <p:nvSpPr>
+          <p:cNvPr id="66" name="TextBox 65">
+            <a:extLst>
+              <a:ext uri="{FF2B5EF4-FFF2-40B4-BE49-F238E27FC236}">
+                <a16:creationId xmlns:a16="http://schemas.microsoft.com/office/drawing/2014/main" id="{D92BE621-4CB2-E345-9F4C-369893CD7323}"/>
+              </a:ext>
+            </a:extLst>
+          </p:cNvPr>
+          <p:cNvSpPr txBox="1"/>
+          <p:nvPr/>
+        </p:nvSpPr>
+        <p:spPr>
+          <a:xfrm>
+            <a:off x="4742844" y="4066835"/>
+            <a:ext cx="593432" cy="369332"/>
+          </a:xfrm>
+          <a:prstGeom prst="rect">
+            <a:avLst/>
+          </a:prstGeom>
+          <a:noFill/>
+        </p:spPr>
+        <p:txBody>
+          <a:bodyPr wrap="none" rtlCol="0">
+            <a:spAutoFit/>
+          </a:bodyPr>
+          <a:lstStyle/>
+          <a:p>
+            <a:r>
+              <a:rPr lang="en-US" dirty="0"/>
+              <a:t>0.50</a:t>
+            </a:r>
+          </a:p>
+        </p:txBody>
+      </p:sp>
+      <p:sp>
+        <p:nvSpPr>
+          <p:cNvPr id="67" name="TextBox 66">
+            <a:extLst>
+              <a:ext uri="{FF2B5EF4-FFF2-40B4-BE49-F238E27FC236}">
+                <a16:creationId xmlns:a16="http://schemas.microsoft.com/office/drawing/2014/main" id="{C4A64303-26E9-3E4A-B3C2-FAC297331B57}"/>
+              </a:ext>
+            </a:extLst>
+          </p:cNvPr>
+          <p:cNvSpPr txBox="1"/>
+          <p:nvPr/>
+        </p:nvSpPr>
+        <p:spPr>
+          <a:xfrm>
+            <a:off x="3975505" y="2210477"/>
+            <a:ext cx="593432" cy="369332"/>
+          </a:xfrm>
+          <a:prstGeom prst="rect">
+            <a:avLst/>
+          </a:prstGeom>
+          <a:noFill/>
+        </p:spPr>
+        <p:txBody>
+          <a:bodyPr wrap="none" rtlCol="0">
+            <a:spAutoFit/>
+          </a:bodyPr>
+          <a:lstStyle/>
+          <a:p>
+            <a:r>
+              <a:rPr lang="en-US" dirty="0"/>
+              <a:t>0.75</a:t>
+            </a:r>
+          </a:p>
+        </p:txBody>
+      </p:sp>
+      <p:sp>
+        <p:nvSpPr>
+          <p:cNvPr id="68" name="TextBox 67">
+            <a:extLst>
+              <a:ext uri="{FF2B5EF4-FFF2-40B4-BE49-F238E27FC236}">
+                <a16:creationId xmlns:a16="http://schemas.microsoft.com/office/drawing/2014/main" id="{6B365DB7-1B36-2B4F-8CBD-6540AC97FEFC}"/>
+              </a:ext>
+            </a:extLst>
+          </p:cNvPr>
+          <p:cNvSpPr txBox="1"/>
+          <p:nvPr/>
+        </p:nvSpPr>
+        <p:spPr>
+          <a:xfrm>
+            <a:off x="4658174" y="1081467"/>
+            <a:ext cx="593432" cy="369332"/>
+          </a:xfrm>
+          <a:prstGeom prst="rect">
+            <a:avLst/>
+          </a:prstGeom>
+          <a:noFill/>
+        </p:spPr>
+        <p:txBody>
+          <a:bodyPr wrap="none" rtlCol="0">
+            <a:spAutoFit/>
+          </a:bodyPr>
+          <a:lstStyle/>
+          <a:p>
+            <a:r>
+              <a:rPr lang="en-US" dirty="0"/>
+              <a:t>0.50</a:t>
+            </a:r>
+          </a:p>
+        </p:txBody>
+      </p:sp>
+      <p:sp>
+        <p:nvSpPr>
+          <p:cNvPr id="69" name="TextBox 68">
+            <a:extLst>
+              <a:ext uri="{FF2B5EF4-FFF2-40B4-BE49-F238E27FC236}">
+                <a16:creationId xmlns:a16="http://schemas.microsoft.com/office/drawing/2014/main" id="{C8C988DD-4B3B-954E-8993-842C57E338CB}"/>
+              </a:ext>
+            </a:extLst>
+          </p:cNvPr>
+          <p:cNvSpPr txBox="1"/>
+          <p:nvPr/>
+        </p:nvSpPr>
+        <p:spPr>
+          <a:xfrm>
+            <a:off x="2290369" y="3715687"/>
+            <a:ext cx="593432" cy="369332"/>
+          </a:xfrm>
+          <a:prstGeom prst="rect">
+            <a:avLst/>
+          </a:prstGeom>
+          <a:noFill/>
+        </p:spPr>
+        <p:txBody>
+          <a:bodyPr wrap="none" rtlCol="0">
+            <a:spAutoFit/>
+          </a:bodyPr>
+          <a:lstStyle/>
+          <a:p>
+            <a:r>
+              <a:rPr lang="en-US" dirty="0"/>
+              <a:t>0.50</a:t>
+            </a:r>
+          </a:p>
+        </p:txBody>
+      </p:sp>
+      <p:sp>
+        <p:nvSpPr>
+          <p:cNvPr id="70" name="TextBox 69">
+            <a:extLst>
+              <a:ext uri="{FF2B5EF4-FFF2-40B4-BE49-F238E27FC236}">
+                <a16:creationId xmlns:a16="http://schemas.microsoft.com/office/drawing/2014/main" id="{94BEB97F-2F1E-5D4B-B8DB-16D7D6C9B9B4}"/>
+              </a:ext>
+            </a:extLst>
+          </p:cNvPr>
+          <p:cNvSpPr txBox="1"/>
+          <p:nvPr/>
+        </p:nvSpPr>
+        <p:spPr>
+          <a:xfrm>
+            <a:off x="3057708" y="2586677"/>
+            <a:ext cx="593432" cy="369332"/>
+          </a:xfrm>
+          <a:prstGeom prst="rect">
+            <a:avLst/>
+          </a:prstGeom>
+          <a:noFill/>
+        </p:spPr>
+        <p:txBody>
+          <a:bodyPr wrap="none" rtlCol="0">
+            <a:spAutoFit/>
+          </a:bodyPr>
+          <a:lstStyle/>
+          <a:p>
+            <a:r>
+              <a:rPr lang="en-US" dirty="0"/>
+              <a:t>0.25</a:t>
+            </a:r>
+          </a:p>
+        </p:txBody>
+      </p:sp>
+      <p:sp>
+        <p:nvSpPr>
+          <p:cNvPr id="71" name="TextBox 70">
+            <a:extLst>
+              <a:ext uri="{FF2B5EF4-FFF2-40B4-BE49-F238E27FC236}">
+                <a16:creationId xmlns:a16="http://schemas.microsoft.com/office/drawing/2014/main" id="{0E03608D-B017-B045-8BB8-3AAE509DB887}"/>
+              </a:ext>
+            </a:extLst>
+          </p:cNvPr>
+          <p:cNvSpPr txBox="1"/>
+          <p:nvPr/>
+        </p:nvSpPr>
+        <p:spPr>
+          <a:xfrm>
+            <a:off x="2290369" y="5195845"/>
+            <a:ext cx="593432" cy="369332"/>
+          </a:xfrm>
+          <a:prstGeom prst="rect">
+            <a:avLst/>
+          </a:prstGeom>
+          <a:noFill/>
+        </p:spPr>
+        <p:txBody>
+          <a:bodyPr wrap="none" rtlCol="0">
+            <a:spAutoFit/>
+          </a:bodyPr>
+          <a:lstStyle/>
+          <a:p>
+            <a:r>
+              <a:rPr lang="en-US" dirty="0"/>
+              <a:t>0.25</a:t>
+            </a:r>
+          </a:p>
+        </p:txBody>
+      </p:sp>
+      <p:sp>
+        <p:nvSpPr>
+          <p:cNvPr id="72" name="TextBox 71">
+            <a:extLst>
+              <a:ext uri="{FF2B5EF4-FFF2-40B4-BE49-F238E27FC236}">
+                <a16:creationId xmlns:a16="http://schemas.microsoft.com/office/drawing/2014/main" id="{6F2D9188-E9F4-6549-B7F3-9C685995443E}"/>
+              </a:ext>
+            </a:extLst>
+          </p:cNvPr>
+          <p:cNvSpPr txBox="1"/>
+          <p:nvPr/>
+        </p:nvSpPr>
+        <p:spPr>
+          <a:xfrm>
+            <a:off x="3057708" y="4066835"/>
+            <a:ext cx="593432" cy="369332"/>
+          </a:xfrm>
+          <a:prstGeom prst="rect">
+            <a:avLst/>
+          </a:prstGeom>
+          <a:noFill/>
+        </p:spPr>
+        <p:txBody>
+          <a:bodyPr wrap="none" rtlCol="0">
+            <a:spAutoFit/>
+          </a:bodyPr>
+          <a:lstStyle/>
+          <a:p>
+            <a:r>
+              <a:rPr lang="en-US" dirty="0"/>
+              <a:t>0.25</a:t>
+            </a:r>
+          </a:p>
+        </p:txBody>
+      </p:sp>
+      <p:sp>
+        <p:nvSpPr>
+          <p:cNvPr id="73" name="TextBox 72">
+            <a:extLst>
+              <a:ext uri="{FF2B5EF4-FFF2-40B4-BE49-F238E27FC236}">
+                <a16:creationId xmlns:a16="http://schemas.microsoft.com/office/drawing/2014/main" id="{F7D7774A-D960-DC42-8B2B-155BFFAB2623}"/>
+              </a:ext>
+            </a:extLst>
+          </p:cNvPr>
+          <p:cNvSpPr txBox="1"/>
+          <p:nvPr/>
+        </p:nvSpPr>
+        <p:spPr>
+          <a:xfrm>
+            <a:off x="2290369" y="2210477"/>
+            <a:ext cx="593432" cy="369332"/>
+          </a:xfrm>
+          <a:prstGeom prst="rect">
+            <a:avLst/>
+          </a:prstGeom>
+          <a:noFill/>
+        </p:spPr>
+        <p:txBody>
+          <a:bodyPr wrap="none" rtlCol="0">
+            <a:spAutoFit/>
+          </a:bodyPr>
+          <a:lstStyle/>
+          <a:p>
+            <a:r>
+              <a:rPr lang="en-US" dirty="0"/>
+              <a:t>0.75</a:t>
+            </a:r>
+          </a:p>
+        </p:txBody>
+      </p:sp>
+      <p:sp>
+        <p:nvSpPr>
+          <p:cNvPr id="74" name="TextBox 73">
+            <a:extLst>
+              <a:ext uri="{FF2B5EF4-FFF2-40B4-BE49-F238E27FC236}">
+                <a16:creationId xmlns:a16="http://schemas.microsoft.com/office/drawing/2014/main" id="{2718C281-A6A1-F345-8B98-D3125649F521}"/>
+              </a:ext>
+            </a:extLst>
+          </p:cNvPr>
+          <p:cNvSpPr txBox="1"/>
+          <p:nvPr/>
+        </p:nvSpPr>
+        <p:spPr>
+          <a:xfrm>
+            <a:off x="2973038" y="1081467"/>
+            <a:ext cx="593432" cy="369332"/>
+          </a:xfrm>
+          <a:prstGeom prst="rect">
+            <a:avLst/>
+          </a:prstGeom>
+          <a:noFill/>
+        </p:spPr>
+        <p:txBody>
+          <a:bodyPr wrap="none" rtlCol="0">
+            <a:spAutoFit/>
+          </a:bodyPr>
+          <a:lstStyle/>
+          <a:p>
+            <a:r>
+              <a:rPr lang="en-US" dirty="0"/>
+              <a:t>0.25</a:t>
+            </a:r>
+          </a:p>
+        </p:txBody>
+      </p:sp>
+      <p:sp>
+        <p:nvSpPr>
+          <p:cNvPr id="75" name="TextBox 74">
+            <a:extLst>
+              <a:ext uri="{FF2B5EF4-FFF2-40B4-BE49-F238E27FC236}">
+                <a16:creationId xmlns:a16="http://schemas.microsoft.com/office/drawing/2014/main" id="{8EDD54B7-3AE6-CF4A-BBE6-B9DB026C9112}"/>
+              </a:ext>
+            </a:extLst>
+          </p:cNvPr>
+          <p:cNvSpPr txBox="1"/>
+          <p:nvPr/>
+        </p:nvSpPr>
+        <p:spPr>
+          <a:xfrm>
+            <a:off x="5688159" y="3715687"/>
+            <a:ext cx="593432" cy="369332"/>
+          </a:xfrm>
+          <a:prstGeom prst="rect">
+            <a:avLst/>
+          </a:prstGeom>
+          <a:noFill/>
+        </p:spPr>
+        <p:txBody>
+          <a:bodyPr wrap="none" rtlCol="0">
+            <a:spAutoFit/>
+          </a:bodyPr>
+          <a:lstStyle/>
+          <a:p>
+            <a:r>
+              <a:rPr lang="en-US" dirty="0"/>
+              <a:t>0.50</a:t>
+            </a:r>
+          </a:p>
+        </p:txBody>
+      </p:sp>
+      <p:sp>
+        <p:nvSpPr>
+          <p:cNvPr id="76" name="TextBox 75">
+            <a:extLst>
+              <a:ext uri="{FF2B5EF4-FFF2-40B4-BE49-F238E27FC236}">
+                <a16:creationId xmlns:a16="http://schemas.microsoft.com/office/drawing/2014/main" id="{570936C0-02F1-704C-B282-6935CDE87CD8}"/>
+              </a:ext>
+            </a:extLst>
+          </p:cNvPr>
+          <p:cNvSpPr txBox="1"/>
+          <p:nvPr/>
+        </p:nvSpPr>
+        <p:spPr>
+          <a:xfrm>
+            <a:off x="6455498" y="2586677"/>
+            <a:ext cx="593432" cy="369332"/>
+          </a:xfrm>
+          <a:prstGeom prst="rect">
+            <a:avLst/>
+          </a:prstGeom>
+          <a:noFill/>
+        </p:spPr>
+        <p:txBody>
+          <a:bodyPr wrap="none" rtlCol="0">
+            <a:spAutoFit/>
+          </a:bodyPr>
+          <a:lstStyle/>
+          <a:p>
+            <a:r>
+              <a:rPr lang="en-US" dirty="0"/>
+              <a:t>0.75</a:t>
+            </a:r>
+          </a:p>
+        </p:txBody>
+      </p:sp>
+      <p:sp>
+        <p:nvSpPr>
+          <p:cNvPr id="77" name="TextBox 76">
+            <a:extLst>
+              <a:ext uri="{FF2B5EF4-FFF2-40B4-BE49-F238E27FC236}">
+                <a16:creationId xmlns:a16="http://schemas.microsoft.com/office/drawing/2014/main" id="{2DEAFD60-2275-C64C-8B8E-DE2BF8FB91F5}"/>
+              </a:ext>
+            </a:extLst>
+          </p:cNvPr>
+          <p:cNvSpPr txBox="1"/>
+          <p:nvPr/>
+        </p:nvSpPr>
+        <p:spPr>
+          <a:xfrm>
+            <a:off x="5688159" y="5195845"/>
+            <a:ext cx="593432" cy="369332"/>
+          </a:xfrm>
+          <a:prstGeom prst="rect">
+            <a:avLst/>
+          </a:prstGeom>
+          <a:noFill/>
+        </p:spPr>
+        <p:txBody>
+          <a:bodyPr wrap="none" rtlCol="0">
+            <a:spAutoFit/>
+          </a:bodyPr>
+          <a:lstStyle/>
+          <a:p>
+            <a:r>
+              <a:rPr lang="en-US" dirty="0"/>
+              <a:t>0.25</a:t>
+            </a:r>
+          </a:p>
+        </p:txBody>
+      </p:sp>
+      <p:sp>
+        <p:nvSpPr>
+          <p:cNvPr id="78" name="TextBox 77">
+            <a:extLst>
+              <a:ext uri="{FF2B5EF4-FFF2-40B4-BE49-F238E27FC236}">
+                <a16:creationId xmlns:a16="http://schemas.microsoft.com/office/drawing/2014/main" id="{97F9BD6C-1AAF-594F-AA15-583749F31DBA}"/>
+              </a:ext>
+            </a:extLst>
+          </p:cNvPr>
+          <p:cNvSpPr txBox="1"/>
+          <p:nvPr/>
+        </p:nvSpPr>
+        <p:spPr>
+          <a:xfrm>
+            <a:off x="6455498" y="4066835"/>
+            <a:ext cx="593432" cy="369332"/>
+          </a:xfrm>
+          <a:prstGeom prst="rect">
+            <a:avLst/>
+          </a:prstGeom>
+          <a:noFill/>
+        </p:spPr>
+        <p:txBody>
+          <a:bodyPr wrap="none" rtlCol="0">
+            <a:spAutoFit/>
+          </a:bodyPr>
+          <a:lstStyle/>
+          <a:p>
+            <a:r>
+              <a:rPr lang="en-US" dirty="0"/>
+              <a:t>0.75</a:t>
+            </a:r>
+          </a:p>
+        </p:txBody>
+      </p:sp>
+      <p:sp>
+        <p:nvSpPr>
+          <p:cNvPr id="79" name="TextBox 78">
+            <a:extLst>
+              <a:ext uri="{FF2B5EF4-FFF2-40B4-BE49-F238E27FC236}">
+                <a16:creationId xmlns:a16="http://schemas.microsoft.com/office/drawing/2014/main" id="{A4E9BF68-BBA6-2747-B6DE-674DF8903593}"/>
+              </a:ext>
+            </a:extLst>
+          </p:cNvPr>
+          <p:cNvSpPr txBox="1"/>
+          <p:nvPr/>
+        </p:nvSpPr>
+        <p:spPr>
+          <a:xfrm>
+            <a:off x="5688159" y="2210477"/>
+            <a:ext cx="593432" cy="369332"/>
+          </a:xfrm>
+          <a:prstGeom prst="rect">
+            <a:avLst/>
+          </a:prstGeom>
+          <a:noFill/>
+        </p:spPr>
+        <p:txBody>
+          <a:bodyPr wrap="none" rtlCol="0">
+            <a:spAutoFit/>
+          </a:bodyPr>
+          <a:lstStyle/>
+          <a:p>
+            <a:r>
+              <a:rPr lang="en-US" dirty="0"/>
+              <a:t>0.75</a:t>
+            </a:r>
+          </a:p>
+        </p:txBody>
+      </p:sp>
+      <p:sp>
+        <p:nvSpPr>
+          <p:cNvPr id="80" name="TextBox 79">
+            <a:extLst>
+              <a:ext uri="{FF2B5EF4-FFF2-40B4-BE49-F238E27FC236}">
+                <a16:creationId xmlns:a16="http://schemas.microsoft.com/office/drawing/2014/main" id="{9DE218B3-9A0C-7442-912D-5C4A85CD58E0}"/>
+              </a:ext>
+            </a:extLst>
+          </p:cNvPr>
+          <p:cNvSpPr txBox="1"/>
+          <p:nvPr/>
+        </p:nvSpPr>
+        <p:spPr>
+          <a:xfrm>
+            <a:off x="6370828" y="1081467"/>
+            <a:ext cx="593432" cy="369332"/>
+          </a:xfrm>
+          <a:prstGeom prst="rect">
+            <a:avLst/>
+          </a:prstGeom>
+          <a:noFill/>
+        </p:spPr>
+        <p:txBody>
+          <a:bodyPr wrap="none" rtlCol="0">
+            <a:spAutoFit/>
+          </a:bodyPr>
+          <a:lstStyle/>
+          <a:p>
+            <a:r>
+              <a:rPr lang="en-US" dirty="0"/>
+              <a:t>0.75</a:t>
+            </a:r>
+          </a:p>
+        </p:txBody>
+      </p:sp>
+    </p:spTree>
+    <p:extLst>
+      <p:ext uri="{BB962C8B-B14F-4D97-AF65-F5344CB8AC3E}">
+        <p14:creationId xmlns:p14="http://schemas.microsoft.com/office/powerpoint/2010/main" val="2215891509"/>
       </p:ext>
     </p:extLst>
   </p:cSld>

</xml_diff>